<commit_message>
Presentation added, Enum, Records
</commit_message>
<xml_diff>
--- a/presentation/JavaSE102ТипыОператоры.pptx
+++ b/presentation/JavaSE102ТипыОператоры.pptx
@@ -6544,7 +6544,7 @@
         <p:spPr>
           <a:xfrm>
             <a:off x="1350360" y="4392000"/>
-            <a:ext cx="6855480" cy="1435680"/>
+            <a:ext cx="6855120" cy="1435320"/>
           </a:xfrm>
           <a:prstGeom prst="rect">
             <a:avLst/>
@@ -6604,6 +6604,26 @@
               <a:latin typeface="Arial"/>
             </a:endParaRPr>
           </a:p>
+          <a:p>
+            <a:pPr>
+              <a:lnSpc>
+                <a:spcPct val="100000"/>
+              </a:lnSpc>
+            </a:pPr>
+            <a:r>
+              <a:rPr b="1" lang="en-US" sz="3000" spc="-1" strike="noStrike" cap="all">
+                <a:solidFill>
+                  <a:srgbClr val="376092"/>
+                </a:solidFill>
+                <a:latin typeface="Tahoma"/>
+                <a:ea typeface="Tahoma"/>
+              </a:rPr>
+              <a:t>Типы данных и операторы</a:t>
+            </a:r>
+            <a:endParaRPr b="0" lang="ru-RU" sz="3000" spc="-1" strike="noStrike">
+              <a:latin typeface="Arial"/>
+            </a:endParaRPr>
+          </a:p>
         </p:txBody>
       </p:sp>
       <p:pic>
@@ -6619,7 +6639,7 @@
         <p:spPr>
           <a:xfrm>
             <a:off x="7661520" y="162720"/>
-            <a:ext cx="1207080" cy="2247120"/>
+            <a:ext cx="1206720" cy="2246760"/>
           </a:xfrm>
           <a:prstGeom prst="rect">
             <a:avLst/>
@@ -6668,7 +6688,7 @@
         <p:spPr>
           <a:xfrm>
             <a:off x="457200" y="274680"/>
-            <a:ext cx="8227080" cy="713520"/>
+            <a:ext cx="8226720" cy="713160"/>
           </a:xfrm>
           <a:prstGeom prst="rect">
             <a:avLst/>
@@ -6719,7 +6739,7 @@
         <p:spPr>
           <a:xfrm>
             <a:off x="914400" y="1219320"/>
-            <a:ext cx="7312680" cy="4798080"/>
+            <a:ext cx="7312320" cy="4797720"/>
           </a:xfrm>
           <a:prstGeom prst="rect">
             <a:avLst/>
@@ -6894,7 +6914,7 @@
         <p:spPr>
           <a:xfrm>
             <a:off x="457200" y="274680"/>
-            <a:ext cx="8227080" cy="713520"/>
+            <a:ext cx="8226720" cy="713160"/>
           </a:xfrm>
           <a:prstGeom prst="rect">
             <a:avLst/>
@@ -6945,7 +6965,7 @@
         <p:spPr>
           <a:xfrm>
             <a:off x="914400" y="1219320"/>
-            <a:ext cx="7312680" cy="4798080"/>
+            <a:ext cx="7312320" cy="4797720"/>
           </a:xfrm>
           <a:prstGeom prst="rect">
             <a:avLst/>
@@ -6992,7 +7012,7 @@
             </a:endParaRPr>
           </a:p>
           <a:p>
-            <a:pPr marL="216000" indent="-215280" algn="just">
+            <a:pPr marL="216000" indent="-214920" algn="just">
               <a:lnSpc>
                 <a:spcPct val="100000"/>
               </a:lnSpc>
@@ -7023,7 +7043,7 @@
             </a:endParaRPr>
           </a:p>
           <a:p>
-            <a:pPr marL="216000" indent="-215280" algn="just">
+            <a:pPr marL="216000" indent="-214920" algn="just">
               <a:lnSpc>
                 <a:spcPct val="100000"/>
               </a:lnSpc>
@@ -7126,7 +7146,7 @@
         <p:spPr>
           <a:xfrm>
             <a:off x="457200" y="274680"/>
-            <a:ext cx="8227080" cy="713520"/>
+            <a:ext cx="8226720" cy="713160"/>
           </a:xfrm>
           <a:prstGeom prst="rect">
             <a:avLst/>
@@ -7177,7 +7197,7 @@
         <p:spPr>
           <a:xfrm>
             <a:off x="914400" y="1219320"/>
-            <a:ext cx="7312680" cy="3639960"/>
+            <a:ext cx="7312320" cy="3639600"/>
           </a:xfrm>
           <a:prstGeom prst="rect">
             <a:avLst/>
@@ -7340,7 +7360,7 @@
             </a:endParaRPr>
           </a:p>
           <a:p>
-            <a:pPr marL="216000" indent="-215280" algn="just">
+            <a:pPr marL="216000" indent="-214920" algn="just">
               <a:lnSpc>
                 <a:spcPct val="100000"/>
               </a:lnSpc>
@@ -7371,7 +7391,7 @@
             </a:endParaRPr>
           </a:p>
           <a:p>
-            <a:pPr marL="216000" indent="-215280" algn="just">
+            <a:pPr marL="216000" indent="-214920" algn="just">
               <a:lnSpc>
                 <a:spcPct val="100000"/>
               </a:lnSpc>
@@ -7458,7 +7478,7 @@
         <p:spPr>
           <a:xfrm>
             <a:off x="3678840" y="4140000"/>
-            <a:ext cx="4865040" cy="2424240"/>
+            <a:ext cx="4864680" cy="2423880"/>
           </a:xfrm>
           <a:prstGeom prst="rect">
             <a:avLst/>
@@ -7477,7 +7497,7 @@
         <p:spPr>
           <a:xfrm>
             <a:off x="2700000" y="4680000"/>
-            <a:ext cx="3419280" cy="345600"/>
+            <a:ext cx="3418920" cy="345240"/>
           </a:xfrm>
           <a:prstGeom prst="rect">
             <a:avLst/>
@@ -7558,7 +7578,7 @@
         <p:spPr>
           <a:xfrm>
             <a:off x="457200" y="274680"/>
-            <a:ext cx="8227080" cy="713520"/>
+            <a:ext cx="8226720" cy="713160"/>
           </a:xfrm>
           <a:prstGeom prst="rect">
             <a:avLst/>
@@ -7609,13 +7629,13 @@
         <p:spPr>
           <a:xfrm>
             <a:off x="928800" y="1935360"/>
-            <a:ext cx="7212600" cy="3224520"/>
+            <a:ext cx="7212240" cy="3224520"/>
           </a:xfrm>
           <a:prstGeom prst="rect">
             <a:avLst/>
           </a:prstGeom>
           <a:solidFill>
-            <a:srgbClr val="b4c7dc"/>
+            <a:srgbClr val="eeeeee"/>
           </a:solidFill>
           <a:ln w="9525">
             <a:noFill/>
@@ -8646,7 +8666,7 @@
         <p:spPr>
           <a:xfrm>
             <a:off x="457200" y="274680"/>
-            <a:ext cx="8227080" cy="713520"/>
+            <a:ext cx="8226720" cy="713160"/>
           </a:xfrm>
           <a:prstGeom prst="rect">
             <a:avLst/>
@@ -8697,7 +8717,7 @@
         <p:spPr>
           <a:xfrm>
             <a:off x="914400" y="1219320"/>
-            <a:ext cx="7312680" cy="4798080"/>
+            <a:ext cx="7312320" cy="4797720"/>
           </a:xfrm>
           <a:prstGeom prst="rect">
             <a:avLst/>
@@ -8932,13 +8952,13 @@
         <p:spPr>
           <a:xfrm>
             <a:off x="1000080" y="2078280"/>
-            <a:ext cx="7141320" cy="1230480"/>
+            <a:ext cx="7140960" cy="1230480"/>
           </a:xfrm>
           <a:prstGeom prst="rect">
             <a:avLst/>
           </a:prstGeom>
           <a:solidFill>
-            <a:srgbClr val="b4c7dc"/>
+            <a:srgbClr val="eeeeee"/>
           </a:solidFill>
           <a:ln w="9525">
             <a:noFill/>
@@ -9207,13 +9227,13 @@
         <p:spPr>
           <a:xfrm>
             <a:off x="1000080" y="4861800"/>
-            <a:ext cx="7141320" cy="774000"/>
+            <a:ext cx="7140960" cy="774000"/>
           </a:xfrm>
           <a:prstGeom prst="rect">
             <a:avLst/>
           </a:prstGeom>
           <a:solidFill>
-            <a:srgbClr val="b4c7dc"/>
+            <a:srgbClr val="eeeeee"/>
           </a:solidFill>
           <a:ln w="9525">
             <a:noFill/>
@@ -9396,7 +9416,7 @@
         <p:spPr>
           <a:xfrm>
             <a:off x="457200" y="274680"/>
-            <a:ext cx="8227080" cy="713520"/>
+            <a:ext cx="8226720" cy="713160"/>
           </a:xfrm>
           <a:prstGeom prst="rect">
             <a:avLst/>
@@ -9447,13 +9467,13 @@
         <p:spPr>
           <a:xfrm>
             <a:off x="928800" y="1311840"/>
-            <a:ext cx="7212600" cy="4469760"/>
+            <a:ext cx="7212240" cy="4469760"/>
           </a:xfrm>
           <a:prstGeom prst="rect">
             <a:avLst/>
           </a:prstGeom>
           <a:solidFill>
-            <a:srgbClr val="b4c7dc"/>
+            <a:srgbClr val="eeeeee"/>
           </a:solidFill>
           <a:ln w="9525">
             <a:noFill/>
@@ -10684,7 +10704,7 @@
         <p:spPr>
           <a:xfrm>
             <a:off x="457200" y="274680"/>
-            <a:ext cx="8227080" cy="713520"/>
+            <a:ext cx="8226720" cy="713160"/>
           </a:xfrm>
           <a:prstGeom prst="rect">
             <a:avLst/>
@@ -10735,13 +10755,13 @@
         <p:spPr>
           <a:xfrm>
             <a:off x="928800" y="1285920"/>
-            <a:ext cx="7284240" cy="2827440"/>
+            <a:ext cx="7283880" cy="2827440"/>
           </a:xfrm>
           <a:prstGeom prst="rect">
             <a:avLst/>
           </a:prstGeom>
           <a:solidFill>
-            <a:srgbClr val="b4c7dc"/>
+            <a:srgbClr val="eeeeee"/>
           </a:solidFill>
           <a:ln w="0">
             <a:noFill/>
@@ -11449,7 +11469,7 @@
         <p:spPr>
           <a:xfrm>
             <a:off x="928800" y="4286160"/>
-            <a:ext cx="7312680" cy="421200"/>
+            <a:ext cx="7312320" cy="420840"/>
           </a:xfrm>
           <a:prstGeom prst="rect">
             <a:avLst/>
@@ -11470,7 +11490,7 @@
             <a:noAutofit/>
           </a:bodyPr>
           <a:p>
-            <a:pPr marL="285840" indent="-283320">
+            <a:pPr marL="285840" indent="-282960">
               <a:lnSpc>
                 <a:spcPct val="100000"/>
               </a:lnSpc>
@@ -11506,13 +11526,13 @@
         <p:spPr>
           <a:xfrm>
             <a:off x="2928960" y="4429080"/>
-            <a:ext cx="2640600" cy="1581480"/>
+            <a:ext cx="2640240" cy="1581480"/>
           </a:xfrm>
           <a:prstGeom prst="rect">
             <a:avLst/>
           </a:prstGeom>
           <a:solidFill>
-            <a:srgbClr val="b4c7dc"/>
+            <a:srgbClr val="eeeeee"/>
           </a:solidFill>
           <a:ln w="0">
             <a:noFill/>
@@ -11709,7 +11729,7 @@
         <p:spPr>
           <a:xfrm>
             <a:off x="457200" y="274680"/>
-            <a:ext cx="8227080" cy="713520"/>
+            <a:ext cx="8226720" cy="713160"/>
           </a:xfrm>
           <a:prstGeom prst="rect">
             <a:avLst/>
@@ -11760,7 +11780,7 @@
         <p:spPr>
           <a:xfrm>
             <a:off x="914400" y="1219320"/>
-            <a:ext cx="7312680" cy="4798080"/>
+            <a:ext cx="7312320" cy="4797720"/>
           </a:xfrm>
           <a:prstGeom prst="rect">
             <a:avLst/>
@@ -12121,7 +12141,7 @@
         <p:spPr>
           <a:xfrm>
             <a:off x="457200" y="274680"/>
-            <a:ext cx="8227080" cy="713520"/>
+            <a:ext cx="8226720" cy="713160"/>
           </a:xfrm>
           <a:prstGeom prst="rect">
             <a:avLst/>
@@ -12170,14 +12190,14 @@
           <p:nvPr>
             <p:extLst>
               <p:ext uri="{D42A27DB-BD31-4B8C-83A1-F6EECF244321}">
-                <p14:modId xmlns:p14="http://schemas.microsoft.com/office/powerpoint/2010/main" val="98716141"/>
+                <p14:modId xmlns:p14="http://schemas.microsoft.com/office/powerpoint/2010/main" val="1753801116"/>
               </p:ext>
             </p:extLst>
           </p:nvPr>
         </p:nvGraphicFramePr>
         <p:xfrm>
           <a:off x="2214720" y="1285920"/>
-          <a:ext cx="4783680" cy="4750560"/>
+          <a:ext cx="4783320" cy="4750200"/>
         </p:xfrm>
         <a:graphic>
           <a:graphicData uri="http://schemas.openxmlformats.org/drawingml/2006/diagram">
@@ -12224,7 +12244,7 @@
         <p:spPr>
           <a:xfrm>
             <a:off x="457200" y="274680"/>
-            <a:ext cx="8227080" cy="713520"/>
+            <a:ext cx="8226720" cy="713160"/>
           </a:xfrm>
           <a:prstGeom prst="rect">
             <a:avLst/>
@@ -12290,7 +12310,7 @@
         <p:spPr>
           <a:xfrm>
             <a:off x="914400" y="1219320"/>
-            <a:ext cx="7312680" cy="4798080"/>
+            <a:ext cx="7312320" cy="4797720"/>
           </a:xfrm>
           <a:prstGeom prst="rect">
             <a:avLst/>
@@ -12453,7 +12473,7 @@
             </a:endParaRPr>
           </a:p>
           <a:p>
-            <a:pPr marL="723960" indent="-365760" algn="just">
+            <a:pPr marL="723960" indent="-365400" algn="just">
               <a:lnSpc>
                 <a:spcPct val="100000"/>
               </a:lnSpc>
@@ -12495,7 +12515,7 @@
             </a:endParaRPr>
           </a:p>
           <a:p>
-            <a:pPr marL="723960" indent="-365760" algn="just">
+            <a:pPr marL="723960" indent="-365400" algn="just">
               <a:lnSpc>
                 <a:spcPct val="100000"/>
               </a:lnSpc>
@@ -12593,7 +12613,7 @@
         <p:spPr>
           <a:xfrm>
             <a:off x="457200" y="274680"/>
-            <a:ext cx="8227080" cy="713520"/>
+            <a:ext cx="8226720" cy="713160"/>
           </a:xfrm>
           <a:prstGeom prst="rect">
             <a:avLst/>
@@ -12644,7 +12664,7 @@
         <p:spPr>
           <a:xfrm>
             <a:off x="914400" y="1219320"/>
-            <a:ext cx="7312680" cy="4798080"/>
+            <a:ext cx="7312320" cy="4797720"/>
           </a:xfrm>
           <a:prstGeom prst="rect">
             <a:avLst/>
@@ -12665,7 +12685,7 @@
             <a:noAutofit/>
           </a:bodyPr>
           <a:p>
-            <a:pPr marL="447840" indent="-445320">
+            <a:pPr marL="447840" indent="-444960">
               <a:lnSpc>
                 <a:spcPct val="100000"/>
               </a:lnSpc>
@@ -12693,7 +12713,7 @@
             </a:endParaRPr>
           </a:p>
           <a:p>
-            <a:pPr marL="447840" indent="-445320">
+            <a:pPr marL="447840" indent="-444960">
               <a:lnSpc>
                 <a:spcPct val="100000"/>
               </a:lnSpc>
@@ -12721,7 +12741,7 @@
             </a:endParaRPr>
           </a:p>
           <a:p>
-            <a:pPr marL="447840" indent="-445320">
+            <a:pPr marL="447840" indent="-444960">
               <a:lnSpc>
                 <a:spcPct val="100000"/>
               </a:lnSpc>
@@ -12749,7 +12769,7 @@
             </a:endParaRPr>
           </a:p>
           <a:p>
-            <a:pPr marL="447840" indent="-445320">
+            <a:pPr marL="447840" indent="-444960">
               <a:lnSpc>
                 <a:spcPct val="100000"/>
               </a:lnSpc>
@@ -12777,7 +12797,7 @@
             </a:endParaRPr>
           </a:p>
           <a:p>
-            <a:pPr marL="447840" indent="-445320">
+            <a:pPr marL="447840" indent="-444960">
               <a:lnSpc>
                 <a:spcPct val="100000"/>
               </a:lnSpc>
@@ -12858,7 +12878,7 @@
         <p:spPr>
           <a:xfrm>
             <a:off x="457200" y="274680"/>
-            <a:ext cx="8227080" cy="713520"/>
+            <a:ext cx="8226720" cy="713160"/>
           </a:xfrm>
           <a:prstGeom prst="rect">
             <a:avLst/>
@@ -12909,7 +12929,7 @@
         <p:spPr>
           <a:xfrm>
             <a:off x="914400" y="1219320"/>
-            <a:ext cx="7312680" cy="4798080"/>
+            <a:ext cx="7312320" cy="4797720"/>
           </a:xfrm>
           <a:prstGeom prst="rect">
             <a:avLst/>
@@ -12930,7 +12950,7 @@
             <a:noAutofit/>
           </a:bodyPr>
           <a:p>
-            <a:pPr marL="723960" indent="-365760" algn="just">
+            <a:pPr marL="723960" indent="-365400" algn="just">
               <a:lnSpc>
                 <a:spcPct val="100000"/>
               </a:lnSpc>
@@ -12999,7 +13019,7 @@
             </a:endParaRPr>
           </a:p>
           <a:p>
-            <a:pPr marL="723960" indent="-365760" algn="just">
+            <a:pPr marL="723960" indent="-365400" algn="just">
               <a:lnSpc>
                 <a:spcPct val="100000"/>
               </a:lnSpc>
@@ -13048,7 +13068,7 @@
             </a:endParaRPr>
           </a:p>
           <a:p>
-            <a:pPr marL="723960" indent="-365760" algn="just">
+            <a:pPr marL="723960" indent="-365400" algn="just">
               <a:lnSpc>
                 <a:spcPct val="100000"/>
               </a:lnSpc>
@@ -13097,7 +13117,7 @@
             </a:endParaRPr>
           </a:p>
           <a:p>
-            <a:pPr marL="723960" indent="-365760" algn="just">
+            <a:pPr marL="723960" indent="-365400" algn="just">
               <a:lnSpc>
                 <a:spcPct val="100000"/>
               </a:lnSpc>
@@ -13189,7 +13209,7 @@
         <p:spPr>
           <a:xfrm>
             <a:off x="457200" y="274680"/>
-            <a:ext cx="8227080" cy="713520"/>
+            <a:ext cx="8226720" cy="713160"/>
           </a:xfrm>
           <a:prstGeom prst="rect">
             <a:avLst/>
@@ -13260,13 +13280,13 @@
         <p:spPr>
           <a:xfrm>
             <a:off x="540000" y="984240"/>
-            <a:ext cx="7917840" cy="5630400"/>
+            <a:ext cx="7917480" cy="5630400"/>
           </a:xfrm>
           <a:prstGeom prst="rect">
             <a:avLst/>
           </a:prstGeom>
           <a:solidFill>
-            <a:srgbClr val="b4c7dc"/>
+            <a:srgbClr val="eeeeee"/>
           </a:solidFill>
           <a:ln w="9525">
             <a:noFill/>
@@ -14752,7 +14772,7 @@
         <p:spPr>
           <a:xfrm>
             <a:off x="457200" y="274680"/>
-            <a:ext cx="8227080" cy="713520"/>
+            <a:ext cx="8226720" cy="713160"/>
           </a:xfrm>
           <a:prstGeom prst="rect">
             <a:avLst/>
@@ -14823,7 +14843,7 @@
         <p:spPr>
           <a:xfrm>
             <a:off x="928800" y="3143160"/>
-            <a:ext cx="7312680" cy="421200"/>
+            <a:ext cx="7312320" cy="420840"/>
           </a:xfrm>
           <a:prstGeom prst="rect">
             <a:avLst/>
@@ -14844,7 +14864,7 @@
             <a:noAutofit/>
           </a:bodyPr>
           <a:p>
-            <a:pPr marL="285840" indent="-283320">
+            <a:pPr marL="285840" indent="-282960">
               <a:lnSpc>
                 <a:spcPct val="100000"/>
               </a:lnSpc>
@@ -14880,13 +14900,13 @@
         <p:spPr>
           <a:xfrm>
             <a:off x="2714760" y="1954080"/>
-            <a:ext cx="3640680" cy="2647080"/>
+            <a:ext cx="3640320" cy="2647080"/>
           </a:xfrm>
           <a:prstGeom prst="rect">
             <a:avLst/>
           </a:prstGeom>
           <a:solidFill>
-            <a:srgbClr val="b4c7dc"/>
+            <a:srgbClr val="eeeeee"/>
           </a:solidFill>
           <a:ln w="0">
             <a:noFill/>
@@ -15183,7 +15203,7 @@
         <p:spPr>
           <a:xfrm>
             <a:off x="457200" y="274680"/>
-            <a:ext cx="8227080" cy="713520"/>
+            <a:ext cx="8226720" cy="713160"/>
           </a:xfrm>
           <a:prstGeom prst="rect">
             <a:avLst/>
@@ -15254,7 +15274,7 @@
         <p:spPr>
           <a:xfrm>
             <a:off x="914400" y="1219320"/>
-            <a:ext cx="7312680" cy="4798080"/>
+            <a:ext cx="7312320" cy="4797720"/>
           </a:xfrm>
           <a:prstGeom prst="rect">
             <a:avLst/>
@@ -15497,7 +15517,7 @@
         <p:spPr>
           <a:xfrm>
             <a:off x="2000160" y="2787480"/>
-            <a:ext cx="5155200" cy="332640"/>
+            <a:ext cx="5154840" cy="332640"/>
           </a:xfrm>
           <a:prstGeom prst="rect">
             <a:avLst/>
@@ -15582,7 +15602,7 @@
         <p:spPr>
           <a:xfrm>
             <a:off x="457200" y="274680"/>
-            <a:ext cx="8227080" cy="713520"/>
+            <a:ext cx="8226720" cy="713160"/>
           </a:xfrm>
           <a:prstGeom prst="rect">
             <a:avLst/>
@@ -15653,7 +15673,7 @@
         <p:spPr>
           <a:xfrm>
             <a:off x="914400" y="1219320"/>
-            <a:ext cx="7312680" cy="4798080"/>
+            <a:ext cx="7312320" cy="4797720"/>
           </a:xfrm>
           <a:prstGeom prst="rect">
             <a:avLst/>
@@ -15726,13 +15746,13 @@
         <p:spPr>
           <a:xfrm>
             <a:off x="1000080" y="2547360"/>
-            <a:ext cx="7141320" cy="2007360"/>
+            <a:ext cx="7140960" cy="2007360"/>
           </a:xfrm>
           <a:prstGeom prst="rect">
             <a:avLst/>
           </a:prstGeom>
           <a:solidFill>
-            <a:srgbClr val="b4c7dc"/>
+            <a:srgbClr val="eeeeee"/>
           </a:solidFill>
           <a:ln w="9525">
             <a:noFill/>
@@ -16296,7 +16316,7 @@
         <p:spPr>
           <a:xfrm>
             <a:off x="457200" y="274680"/>
-            <a:ext cx="8227080" cy="713520"/>
+            <a:ext cx="8226720" cy="713160"/>
           </a:xfrm>
           <a:prstGeom prst="rect">
             <a:avLst/>
@@ -16367,7 +16387,7 @@
         <p:spPr>
           <a:xfrm>
             <a:off x="914400" y="1219320"/>
-            <a:ext cx="7312680" cy="4798080"/>
+            <a:ext cx="7312320" cy="4797720"/>
           </a:xfrm>
           <a:prstGeom prst="rect">
             <a:avLst/>
@@ -16694,7 +16714,7 @@
         <p:spPr>
           <a:xfrm>
             <a:off x="457200" y="274680"/>
-            <a:ext cx="8227080" cy="713520"/>
+            <a:ext cx="8226720" cy="713160"/>
           </a:xfrm>
           <a:prstGeom prst="rect">
             <a:avLst/>
@@ -16785,13 +16805,13 @@
         <p:spPr>
           <a:xfrm>
             <a:off x="914400" y="1301040"/>
-            <a:ext cx="7298280" cy="2859840"/>
+            <a:ext cx="7297920" cy="2859840"/>
           </a:xfrm>
           <a:prstGeom prst="rect">
             <a:avLst/>
           </a:prstGeom>
           <a:solidFill>
-            <a:srgbClr val="b4c7dc"/>
+            <a:srgbClr val="eeeeee"/>
           </a:solidFill>
           <a:ln w="9525">
             <a:noFill/>
@@ -17627,13 +17647,13 @@
         <p:spPr>
           <a:xfrm>
             <a:off x="2928960" y="4643280"/>
-            <a:ext cx="2069280" cy="942120"/>
+            <a:ext cx="2068920" cy="942120"/>
           </a:xfrm>
           <a:prstGeom prst="rect">
             <a:avLst/>
           </a:prstGeom>
           <a:solidFill>
-            <a:srgbClr val="b4c7dc"/>
+            <a:srgbClr val="eeeeee"/>
           </a:solidFill>
           <a:ln w="0">
             <a:noFill/>
@@ -17740,7 +17760,7 @@
         <p:spPr>
           <a:xfrm>
             <a:off x="928800" y="4286160"/>
-            <a:ext cx="7312680" cy="421200"/>
+            <a:ext cx="7312320" cy="420840"/>
           </a:xfrm>
           <a:prstGeom prst="rect">
             <a:avLst/>
@@ -17761,7 +17781,7 @@
             <a:noAutofit/>
           </a:bodyPr>
           <a:p>
-            <a:pPr marL="285840" indent="-283320">
+            <a:pPr marL="285840" indent="-282960">
               <a:lnSpc>
                 <a:spcPct val="100000"/>
               </a:lnSpc>
@@ -17827,7 +17847,7 @@
         <p:spPr>
           <a:xfrm>
             <a:off x="457200" y="274680"/>
-            <a:ext cx="8227080" cy="713520"/>
+            <a:ext cx="8226720" cy="713160"/>
           </a:xfrm>
           <a:prstGeom prst="rect">
             <a:avLst/>
@@ -17898,7 +17918,7 @@
         <p:spPr>
           <a:xfrm>
             <a:off x="914400" y="1219320"/>
-            <a:ext cx="7312680" cy="4798080"/>
+            <a:ext cx="7312320" cy="4797720"/>
           </a:xfrm>
           <a:prstGeom prst="rect">
             <a:avLst/>
@@ -18161,7 +18181,7 @@
             <a:avLst/>
           </a:prstGeom>
           <a:solidFill>
-            <a:srgbClr val="b4c7dc"/>
+            <a:srgbClr val="eeeeee"/>
           </a:solidFill>
           <a:ln w="9525">
             <a:noFill/>
@@ -18287,7 +18307,7 @@
         <p:spPr>
           <a:xfrm>
             <a:off x="457200" y="274680"/>
-            <a:ext cx="8227080" cy="713520"/>
+            <a:ext cx="8226720" cy="713160"/>
           </a:xfrm>
           <a:prstGeom prst="rect">
             <a:avLst/>
@@ -18358,7 +18378,7 @@
         <p:spPr>
           <a:xfrm>
             <a:off x="914400" y="1219320"/>
-            <a:ext cx="7312680" cy="4798080"/>
+            <a:ext cx="7312320" cy="4797720"/>
           </a:xfrm>
           <a:prstGeom prst="rect">
             <a:avLst/>
@@ -18501,7 +18521,7 @@
         <p:spPr>
           <a:xfrm>
             <a:off x="457200" y="274680"/>
-            <a:ext cx="8227080" cy="713520"/>
+            <a:ext cx="8226720" cy="713160"/>
           </a:xfrm>
           <a:prstGeom prst="rect">
             <a:avLst/>
@@ -18592,13 +18612,13 @@
         <p:spPr>
           <a:xfrm>
             <a:off x="928800" y="1342080"/>
-            <a:ext cx="7284240" cy="3712320"/>
+            <a:ext cx="7283880" cy="3712320"/>
           </a:xfrm>
           <a:prstGeom prst="rect">
             <a:avLst/>
           </a:prstGeom>
           <a:solidFill>
-            <a:srgbClr val="b4c7dc"/>
+            <a:srgbClr val="eeeeee"/>
           </a:solidFill>
           <a:ln w="9525">
             <a:noFill/>
@@ -19383,7 +19403,7 @@
         <p:spPr>
           <a:xfrm>
             <a:off x="928800" y="5072040"/>
-            <a:ext cx="7312680" cy="421200"/>
+            <a:ext cx="7312320" cy="420840"/>
           </a:xfrm>
           <a:prstGeom prst="rect">
             <a:avLst/>
@@ -19404,7 +19424,7 @@
             <a:noAutofit/>
           </a:bodyPr>
           <a:p>
-            <a:pPr marL="285840" indent="-283320">
+            <a:pPr marL="285840" indent="-282960">
               <a:lnSpc>
                 <a:spcPct val="100000"/>
               </a:lnSpc>
@@ -19525,7 +19545,7 @@
         <p:spPr>
           <a:xfrm>
             <a:off x="1828800" y="2514600"/>
-            <a:ext cx="6398280" cy="1435680"/>
+            <a:ext cx="6397920" cy="1435320"/>
           </a:xfrm>
           <a:prstGeom prst="rect">
             <a:avLst/>
@@ -19606,7 +19626,7 @@
         <p:spPr>
           <a:xfrm>
             <a:off x="457200" y="274680"/>
-            <a:ext cx="8227080" cy="713520"/>
+            <a:ext cx="8226720" cy="713160"/>
           </a:xfrm>
           <a:prstGeom prst="rect">
             <a:avLst/>
@@ -19657,7 +19677,7 @@
         <p:spPr>
           <a:xfrm>
             <a:off x="914400" y="1219320"/>
-            <a:ext cx="7312680" cy="4798080"/>
+            <a:ext cx="7312320" cy="4797720"/>
           </a:xfrm>
           <a:prstGeom prst="rect">
             <a:avLst/>
@@ -19744,7 +19764,7 @@
             </a:endParaRPr>
           </a:p>
           <a:p>
-            <a:pPr marL="285840" indent="-283320">
+            <a:pPr marL="285840" indent="-282960">
               <a:lnSpc>
                 <a:spcPct val="100000"/>
               </a:lnSpc>
@@ -19760,7 +19780,7 @@
             </a:endParaRPr>
           </a:p>
           <a:p>
-            <a:pPr marL="285840" indent="-283320" algn="ctr">
+            <a:pPr marL="285840" indent="-282960" algn="ctr">
               <a:lnSpc>
                 <a:spcPct val="100000"/>
               </a:lnSpc>
@@ -19783,7 +19803,7 @@
             </a:endParaRPr>
           </a:p>
           <a:p>
-            <a:pPr marL="285840" indent="-283320" algn="ctr">
+            <a:pPr marL="285840" indent="-282960" algn="ctr">
               <a:lnSpc>
                 <a:spcPct val="100000"/>
               </a:lnSpc>
@@ -19806,7 +19826,7 @@
             </a:endParaRPr>
           </a:p>
           <a:p>
-            <a:pPr marL="285840" indent="-283320" algn="ctr">
+            <a:pPr marL="285840" indent="-282960" algn="ctr">
               <a:lnSpc>
                 <a:spcPct val="100000"/>
               </a:lnSpc>
@@ -19829,7 +19849,7 @@
             </a:endParaRPr>
           </a:p>
           <a:p>
-            <a:pPr marL="285840" indent="-283320">
+            <a:pPr marL="285840" indent="-282960">
               <a:lnSpc>
                 <a:spcPct val="100000"/>
               </a:lnSpc>
@@ -19845,7 +19865,7 @@
             </a:endParaRPr>
           </a:p>
           <a:p>
-            <a:pPr marL="285840" indent="-283320">
+            <a:pPr marL="285840" indent="-282960">
               <a:lnSpc>
                 <a:spcPct val="100000"/>
               </a:lnSpc>
@@ -19891,7 +19911,7 @@
             </a:endParaRPr>
           </a:p>
           <a:p>
-            <a:pPr marL="2336760" indent="-365760">
+            <a:pPr marL="2336760" indent="-365400">
               <a:lnSpc>
                 <a:spcPct val="100000"/>
               </a:lnSpc>
@@ -19934,7 +19954,7 @@
             </a:endParaRPr>
           </a:p>
           <a:p>
-            <a:pPr marL="2336760" indent="-365760">
+            <a:pPr marL="2336760" indent="-365400">
               <a:lnSpc>
                 <a:spcPct val="100000"/>
               </a:lnSpc>
@@ -19966,7 +19986,7 @@
             </a:endParaRPr>
           </a:p>
           <a:p>
-            <a:pPr marL="2336760" indent="-365760">
+            <a:pPr marL="2336760" indent="-365400">
               <a:lnSpc>
                 <a:spcPct val="100000"/>
               </a:lnSpc>
@@ -20009,7 +20029,7 @@
             </a:endParaRPr>
           </a:p>
           <a:p>
-            <a:pPr marL="2336760" indent="-365760">
+            <a:pPr marL="2336760" indent="-365400">
               <a:lnSpc>
                 <a:spcPct val="100000"/>
               </a:lnSpc>
@@ -20041,7 +20061,7 @@
             </a:endParaRPr>
           </a:p>
           <a:p>
-            <a:pPr marL="2336760" indent="-365760">
+            <a:pPr marL="2336760" indent="-365400">
               <a:lnSpc>
                 <a:spcPct val="100000"/>
               </a:lnSpc>
@@ -20084,7 +20104,7 @@
             </a:endParaRPr>
           </a:p>
           <a:p>
-            <a:pPr marL="2336760" indent="-365760">
+            <a:pPr marL="2336760" indent="-365400">
               <a:lnSpc>
                 <a:spcPct val="100000"/>
               </a:lnSpc>
@@ -20172,7 +20192,7 @@
         <p:spPr>
           <a:xfrm>
             <a:off x="457200" y="274680"/>
-            <a:ext cx="8227080" cy="713520"/>
+            <a:ext cx="8226720" cy="713160"/>
           </a:xfrm>
           <a:prstGeom prst="rect">
             <a:avLst/>
@@ -20243,13 +20263,13 @@
         <p:spPr>
           <a:xfrm>
             <a:off x="928800" y="1232640"/>
-            <a:ext cx="7284240" cy="3192120"/>
+            <a:ext cx="7283880" cy="3192120"/>
           </a:xfrm>
           <a:prstGeom prst="rect">
             <a:avLst/>
           </a:prstGeom>
           <a:solidFill>
-            <a:srgbClr val="b4c7dc"/>
+            <a:srgbClr val="eeeeee"/>
           </a:solidFill>
           <a:ln w="9525">
             <a:noFill/>
@@ -21387,7 +21407,7 @@
         <p:spPr>
           <a:xfrm>
             <a:off x="928800" y="4572000"/>
-            <a:ext cx="7312680" cy="421200"/>
+            <a:ext cx="7312320" cy="420840"/>
           </a:xfrm>
           <a:prstGeom prst="rect">
             <a:avLst/>
@@ -21408,7 +21428,7 @@
             <a:noAutofit/>
           </a:bodyPr>
           <a:p>
-            <a:pPr marL="285840" indent="-283320">
+            <a:pPr marL="285840" indent="-282960">
               <a:lnSpc>
                 <a:spcPct val="100000"/>
               </a:lnSpc>
@@ -21444,13 +21464,13 @@
         <p:spPr>
           <a:xfrm>
             <a:off x="2428920" y="4714920"/>
-            <a:ext cx="4569480" cy="942120"/>
+            <a:ext cx="4569120" cy="942120"/>
           </a:xfrm>
           <a:prstGeom prst="rect">
             <a:avLst/>
           </a:prstGeom>
           <a:solidFill>
-            <a:srgbClr val="b4c7dc"/>
+            <a:srgbClr val="eeeeee"/>
           </a:solidFill>
           <a:ln w="0">
             <a:noFill/>
@@ -21587,7 +21607,7 @@
         <p:spPr>
           <a:xfrm>
             <a:off x="457200" y="274680"/>
-            <a:ext cx="8227080" cy="713520"/>
+            <a:ext cx="8226720" cy="713160"/>
           </a:xfrm>
           <a:prstGeom prst="rect">
             <a:avLst/>
@@ -21648,7 +21668,7 @@
         <p:spPr>
           <a:xfrm>
             <a:off x="914400" y="1219320"/>
-            <a:ext cx="7312680" cy="4798080"/>
+            <a:ext cx="7312320" cy="4797720"/>
           </a:xfrm>
           <a:prstGeom prst="rect">
             <a:avLst/>
@@ -21755,7 +21775,7 @@
         <p:spPr>
           <a:xfrm>
             <a:off x="1357200" y="1928880"/>
-            <a:ext cx="6166800" cy="3978360"/>
+            <a:ext cx="6166440" cy="3978000"/>
           </a:xfrm>
           <a:prstGeom prst="rect">
             <a:avLst/>
@@ -21804,7 +21824,7 @@
         <p:spPr>
           <a:xfrm>
             <a:off x="457200" y="274680"/>
-            <a:ext cx="8227080" cy="713520"/>
+            <a:ext cx="8226720" cy="713160"/>
           </a:xfrm>
           <a:prstGeom prst="rect">
             <a:avLst/>
@@ -21855,7 +21875,7 @@
         <p:spPr>
           <a:xfrm>
             <a:off x="914400" y="1219320"/>
-            <a:ext cx="7312680" cy="4798080"/>
+            <a:ext cx="7312320" cy="4797720"/>
           </a:xfrm>
           <a:prstGeom prst="rect">
             <a:avLst/>
@@ -21998,7 +22018,7 @@
         <p:spPr>
           <a:xfrm>
             <a:off x="457200" y="274680"/>
-            <a:ext cx="8227080" cy="713520"/>
+            <a:ext cx="8226720" cy="713160"/>
           </a:xfrm>
           <a:prstGeom prst="rect">
             <a:avLst/>
@@ -22069,13 +22089,13 @@
         <p:spPr>
           <a:xfrm>
             <a:off x="928800" y="1662840"/>
-            <a:ext cx="7284240" cy="3286080"/>
+            <a:ext cx="7283880" cy="3286080"/>
           </a:xfrm>
           <a:prstGeom prst="rect">
             <a:avLst/>
           </a:prstGeom>
           <a:solidFill>
-            <a:srgbClr val="b4c7dc"/>
+            <a:srgbClr val="eeeeee"/>
           </a:solidFill>
           <a:ln w="9525">
             <a:noFill/>
@@ -23031,7 +23051,7 @@
         <p:spPr>
           <a:xfrm>
             <a:off x="928800" y="5500800"/>
-            <a:ext cx="7312680" cy="421200"/>
+            <a:ext cx="7312320" cy="420840"/>
           </a:xfrm>
           <a:prstGeom prst="rect">
             <a:avLst/>
@@ -23052,7 +23072,7 @@
             <a:noAutofit/>
           </a:bodyPr>
           <a:p>
-            <a:pPr marL="285840" indent="-283320">
+            <a:pPr marL="285840" indent="-282960">
               <a:lnSpc>
                 <a:spcPct val="100000"/>
               </a:lnSpc>
@@ -23094,7 +23114,7 @@
             <a:avLst/>
           </a:prstGeom>
           <a:solidFill>
-            <a:srgbClr val="b4c7dc"/>
+            <a:srgbClr val="eeeeee"/>
           </a:solidFill>
           <a:ln w="0">
             <a:noFill/>
@@ -23171,7 +23191,7 @@
         <p:spPr>
           <a:xfrm>
             <a:off x="457200" y="274680"/>
-            <a:ext cx="8227080" cy="713520"/>
+            <a:ext cx="8226720" cy="713160"/>
           </a:xfrm>
           <a:prstGeom prst="rect">
             <a:avLst/>
@@ -23222,7 +23242,7 @@
         <p:spPr>
           <a:xfrm>
             <a:off x="914400" y="1219320"/>
-            <a:ext cx="7312680" cy="3098520"/>
+            <a:ext cx="7312320" cy="3098160"/>
           </a:xfrm>
           <a:prstGeom prst="rect">
             <a:avLst/>
@@ -23243,7 +23263,7 @@
             <a:noAutofit/>
           </a:bodyPr>
           <a:p>
-            <a:pPr marL="285840" indent="-283320">
+            <a:pPr marL="285840" indent="-282960">
               <a:lnSpc>
                 <a:spcPct val="100000"/>
               </a:lnSpc>
@@ -23269,7 +23289,7 @@
             </a:endParaRPr>
           </a:p>
           <a:p>
-            <a:pPr marL="285840" indent="-283320">
+            <a:pPr marL="285840" indent="-282960">
               <a:lnSpc>
                 <a:spcPct val="100000"/>
               </a:lnSpc>
@@ -23294,7 +23314,7 @@
         </p:nvGraphicFramePr>
         <p:xfrm>
           <a:off x="1205280" y="1660320"/>
-          <a:ext cx="6928560" cy="317160"/>
+          <a:ext cx="6928560" cy="2807640"/>
         </p:xfrm>
         <a:graphic>
           <a:graphicData uri="http://schemas.openxmlformats.org/drawingml/2006/table">
@@ -24593,7 +24613,7 @@
         <p:spPr>
           <a:xfrm>
             <a:off x="864000" y="4955400"/>
-            <a:ext cx="7775280" cy="1602360"/>
+            <a:ext cx="7774920" cy="1602360"/>
           </a:xfrm>
           <a:custGeom>
             <a:avLst/>
@@ -24622,7 +24642,7 @@
             </a:pathLst>
           </a:custGeom>
           <a:solidFill>
-            <a:srgbClr val="b4c7dc"/>
+            <a:srgbClr val="eeeeee"/>
           </a:solidFill>
           <a:ln w="0">
             <a:noFill/>
@@ -25054,7 +25074,7 @@
         <p:spPr>
           <a:xfrm>
             <a:off x="6480000" y="4680000"/>
-            <a:ext cx="2159280" cy="345960"/>
+            <a:ext cx="2158920" cy="345600"/>
           </a:xfrm>
           <a:prstGeom prst="rect">
             <a:avLst/>
@@ -25086,6 +25106,7 @@
                   <a:srgbClr val="3465a4"/>
                 </a:solidFill>
                 <a:latin typeface="Arial"/>
+                <a:ea typeface="DejaVu Sans"/>
               </a:rPr>
               <a:t>Пример 2.13</a:t>
             </a:r>
@@ -25134,7 +25155,7 @@
         <p:spPr>
           <a:xfrm>
             <a:off x="457200" y="274680"/>
-            <a:ext cx="8227080" cy="713520"/>
+            <a:ext cx="8226720" cy="713160"/>
           </a:xfrm>
           <a:prstGeom prst="rect">
             <a:avLst/>
@@ -25225,13 +25246,13 @@
         <p:spPr>
           <a:xfrm>
             <a:off x="928800" y="1161360"/>
-            <a:ext cx="7284240" cy="4289400"/>
+            <a:ext cx="7283880" cy="4289400"/>
           </a:xfrm>
           <a:prstGeom prst="rect">
             <a:avLst/>
           </a:prstGeom>
           <a:solidFill>
-            <a:srgbClr val="b4c7dc"/>
+            <a:srgbClr val="eeeeee"/>
           </a:solidFill>
           <a:ln w="9525">
             <a:noFill/>
@@ -26927,7 +26948,7 @@
         <p:spPr>
           <a:xfrm>
             <a:off x="928800" y="5500800"/>
-            <a:ext cx="7312680" cy="421200"/>
+            <a:ext cx="7312320" cy="420840"/>
           </a:xfrm>
           <a:prstGeom prst="rect">
             <a:avLst/>
@@ -26948,7 +26969,7 @@
             <a:noAutofit/>
           </a:bodyPr>
           <a:p>
-            <a:pPr marL="285840" indent="-283320">
+            <a:pPr marL="285840" indent="-282960">
               <a:lnSpc>
                 <a:spcPct val="100000"/>
               </a:lnSpc>
@@ -26990,7 +27011,7 @@
             <a:avLst/>
           </a:prstGeom>
           <a:solidFill>
-            <a:srgbClr val="b4c7dc"/>
+            <a:srgbClr val="eeeeee"/>
           </a:solidFill>
           <a:ln w="0">
             <a:noFill/>
@@ -27087,7 +27108,7 @@
         <p:spPr>
           <a:xfrm>
             <a:off x="457200" y="274680"/>
-            <a:ext cx="8227080" cy="713520"/>
+            <a:ext cx="8226720" cy="713160"/>
           </a:xfrm>
           <a:prstGeom prst="rect">
             <a:avLst/>
@@ -27198,13 +27219,13 @@
         <p:spPr>
           <a:xfrm>
             <a:off x="928800" y="1346040"/>
-            <a:ext cx="7284240" cy="3560400"/>
+            <a:ext cx="7283880" cy="3560400"/>
           </a:xfrm>
           <a:prstGeom prst="rect">
             <a:avLst/>
           </a:prstGeom>
           <a:solidFill>
-            <a:srgbClr val="b4c7dc"/>
+            <a:srgbClr val="eeeeee"/>
           </a:solidFill>
           <a:ln w="9525">
             <a:noFill/>
@@ -28421,7 +28442,7 @@
         <p:spPr>
           <a:xfrm>
             <a:off x="928800" y="5500800"/>
-            <a:ext cx="7312680" cy="421200"/>
+            <a:ext cx="7312320" cy="420840"/>
           </a:xfrm>
           <a:prstGeom prst="rect">
             <a:avLst/>
@@ -28442,7 +28463,7 @@
             <a:noAutofit/>
           </a:bodyPr>
           <a:p>
-            <a:pPr marL="285840" indent="-283320">
+            <a:pPr marL="285840" indent="-282960">
               <a:lnSpc>
                 <a:spcPct val="100000"/>
               </a:lnSpc>
@@ -28478,13 +28499,13 @@
         <p:spPr>
           <a:xfrm>
             <a:off x="4175280" y="5220000"/>
-            <a:ext cx="1780920" cy="1368720"/>
+            <a:ext cx="1780560" cy="1368360"/>
           </a:xfrm>
           <a:prstGeom prst="rect">
             <a:avLst/>
           </a:prstGeom>
           <a:solidFill>
-            <a:srgbClr val="b4c7dc"/>
+            <a:srgbClr val="eeeeee"/>
           </a:solidFill>
           <a:ln w="0">
             <a:noFill/>
@@ -28661,7 +28682,7 @@
         <p:spPr>
           <a:xfrm>
             <a:off x="457200" y="274680"/>
-            <a:ext cx="8227080" cy="713520"/>
+            <a:ext cx="8226720" cy="713160"/>
           </a:xfrm>
           <a:prstGeom prst="rect">
             <a:avLst/>
@@ -28752,13 +28773,13 @@
         <p:spPr>
           <a:xfrm>
             <a:off x="900000" y="1410120"/>
-            <a:ext cx="7284240" cy="3773520"/>
+            <a:ext cx="7283880" cy="3773520"/>
           </a:xfrm>
           <a:prstGeom prst="rect">
             <a:avLst/>
           </a:prstGeom>
           <a:solidFill>
-            <a:srgbClr val="b4c7dc"/>
+            <a:srgbClr val="eeeeee"/>
           </a:solidFill>
           <a:ln w="9525">
             <a:solidFill>
@@ -29839,7 +29860,7 @@
         <p:spPr>
           <a:xfrm>
             <a:off x="928800" y="5500800"/>
-            <a:ext cx="7312680" cy="421200"/>
+            <a:ext cx="7312320" cy="420840"/>
           </a:xfrm>
           <a:prstGeom prst="rect">
             <a:avLst/>
@@ -29860,7 +29881,7 @@
             <a:noAutofit/>
           </a:bodyPr>
           <a:p>
-            <a:pPr marL="285840" indent="-283320">
+            <a:pPr marL="285840" indent="-282960">
               <a:lnSpc>
                 <a:spcPct val="100000"/>
               </a:lnSpc>
@@ -29896,7 +29917,7 @@
         <p:spPr>
           <a:xfrm>
             <a:off x="3960000" y="5400000"/>
-            <a:ext cx="714240" cy="729360"/>
+            <a:ext cx="713880" cy="729000"/>
           </a:xfrm>
           <a:prstGeom prst="rect">
             <a:avLst/>
@@ -30023,7 +30044,7 @@
         <p:spPr>
           <a:xfrm>
             <a:off x="457200" y="274680"/>
-            <a:ext cx="8227080" cy="713520"/>
+            <a:ext cx="8226720" cy="713160"/>
           </a:xfrm>
           <a:prstGeom prst="rect">
             <a:avLst/>
@@ -30074,7 +30095,7 @@
         <p:spPr>
           <a:xfrm>
             <a:off x="914400" y="751320"/>
-            <a:ext cx="7312680" cy="2990520"/>
+            <a:ext cx="7312320" cy="2990160"/>
           </a:xfrm>
           <a:prstGeom prst="rect">
             <a:avLst/>
@@ -30095,7 +30116,7 @@
             <a:noAutofit/>
           </a:bodyPr>
           <a:p>
-            <a:pPr marL="285840" indent="-283320">
+            <a:pPr marL="285840" indent="-282960">
               <a:lnSpc>
                 <a:spcPct val="100000"/>
               </a:lnSpc>
@@ -30121,7 +30142,7 @@
             </a:endParaRPr>
           </a:p>
           <a:p>
-            <a:pPr marL="285840" indent="-283320">
+            <a:pPr marL="285840" indent="-282960">
               <a:lnSpc>
                 <a:spcPct val="100000"/>
               </a:lnSpc>
@@ -32356,7 +32377,7 @@
         <p:spPr>
           <a:xfrm>
             <a:off x="3130920" y="4150080"/>
-            <a:ext cx="2734560" cy="718560"/>
+            <a:ext cx="2734200" cy="718200"/>
           </a:xfrm>
           <a:custGeom>
             <a:avLst/>
@@ -33145,7 +33166,7 @@
         <p:spPr>
           <a:xfrm>
             <a:off x="3130920" y="5085000"/>
-            <a:ext cx="2734560" cy="718560"/>
+            <a:ext cx="2734200" cy="718200"/>
           </a:xfrm>
           <a:custGeom>
             <a:avLst/>
@@ -33934,7 +33955,7 @@
         <p:spPr>
           <a:xfrm>
             <a:off x="3126240" y="6021720"/>
-            <a:ext cx="2734560" cy="718560"/>
+            <a:ext cx="2734200" cy="718200"/>
           </a:xfrm>
           <a:custGeom>
             <a:avLst/>
@@ -34065,7 +34086,7 @@
         <p:spPr>
           <a:xfrm>
             <a:off x="457200" y="274680"/>
-            <a:ext cx="8227080" cy="713520"/>
+            <a:ext cx="8226720" cy="713160"/>
           </a:xfrm>
           <a:prstGeom prst="rect">
             <a:avLst/>
@@ -34116,7 +34137,7 @@
         <p:spPr>
           <a:xfrm>
             <a:off x="914400" y="1219320"/>
-            <a:ext cx="7312680" cy="4798080"/>
+            <a:ext cx="7312320" cy="4797720"/>
           </a:xfrm>
           <a:prstGeom prst="rect">
             <a:avLst/>
@@ -34163,7 +34184,7 @@
             </a:endParaRPr>
           </a:p>
           <a:p>
-            <a:pPr marL="719280" indent="-270360" algn="just">
+            <a:pPr marL="719280" indent="-270000" algn="just">
               <a:lnSpc>
                 <a:spcPct val="100000"/>
               </a:lnSpc>
@@ -34205,7 +34226,7 @@
             </a:endParaRPr>
           </a:p>
           <a:p>
-            <a:pPr marL="338040" indent="-335520" algn="just">
+            <a:pPr marL="338040" indent="-335160" algn="just">
               <a:lnSpc>
                 <a:spcPct val="100000"/>
               </a:lnSpc>
@@ -34221,7 +34242,7 @@
             </a:endParaRPr>
           </a:p>
           <a:p>
-            <a:pPr marL="338040" indent="-335520" algn="just">
+            <a:pPr marL="338040" indent="-335160" algn="just">
               <a:lnSpc>
                 <a:spcPct val="100000"/>
               </a:lnSpc>
@@ -34247,7 +34268,7 @@
             </a:endParaRPr>
           </a:p>
           <a:p>
-            <a:pPr marL="719280" indent="-270360" algn="just">
+            <a:pPr marL="719280" indent="-270000" algn="just">
               <a:lnSpc>
                 <a:spcPct val="100000"/>
               </a:lnSpc>
@@ -34289,7 +34310,7 @@
             </a:endParaRPr>
           </a:p>
           <a:p>
-            <a:pPr marL="719280" indent="-270360" algn="just">
+            <a:pPr marL="719280" indent="-270000" algn="just">
               <a:lnSpc>
                 <a:spcPct val="100000"/>
               </a:lnSpc>
@@ -34321,7 +34342,7 @@
             </a:endParaRPr>
           </a:p>
           <a:p>
-            <a:pPr marL="719280" indent="-270360" algn="just">
+            <a:pPr marL="719280" indent="-270000" algn="just">
               <a:lnSpc>
                 <a:spcPct val="100000"/>
               </a:lnSpc>
@@ -34353,7 +34374,7 @@
             </a:endParaRPr>
           </a:p>
           <a:p>
-            <a:pPr marL="719280" indent="-270360" algn="just">
+            <a:pPr marL="719280" indent="-270000" algn="just">
               <a:lnSpc>
                 <a:spcPct val="100000"/>
               </a:lnSpc>
@@ -34385,7 +34406,7 @@
             </a:endParaRPr>
           </a:p>
           <a:p>
-            <a:pPr marL="738360" indent="-278640" algn="just">
+            <a:pPr marL="738360" indent="-278280" algn="just">
               <a:lnSpc>
                 <a:spcPct val="100000"/>
               </a:lnSpc>
@@ -34401,7 +34422,7 @@
             </a:endParaRPr>
           </a:p>
           <a:p>
-            <a:pPr marL="338040" indent="-335520" algn="just">
+            <a:pPr marL="338040" indent="-335160" algn="just">
               <a:lnSpc>
                 <a:spcPct val="100000"/>
               </a:lnSpc>
@@ -34427,7 +34448,7 @@
             </a:endParaRPr>
           </a:p>
           <a:p>
-            <a:pPr marL="338040" indent="-335520">
+            <a:pPr marL="338040" indent="-335160">
               <a:lnSpc>
                 <a:spcPct val="100000"/>
               </a:lnSpc>
@@ -34483,7 +34504,7 @@
         <p:spPr>
           <a:xfrm>
             <a:off x="457200" y="274680"/>
-            <a:ext cx="8227080" cy="713520"/>
+            <a:ext cx="8226720" cy="713160"/>
           </a:xfrm>
           <a:prstGeom prst="rect">
             <a:avLst/>
@@ -34594,13 +34615,13 @@
         <p:spPr>
           <a:xfrm>
             <a:off x="900000" y="1328400"/>
-            <a:ext cx="7284240" cy="5022720"/>
+            <a:ext cx="7283880" cy="5022720"/>
           </a:xfrm>
           <a:prstGeom prst="rect">
             <a:avLst/>
           </a:prstGeom>
           <a:solidFill>
-            <a:srgbClr val="b4c7dc"/>
+            <a:srgbClr val="eeeeee"/>
           </a:solidFill>
           <a:ln w="9525">
             <a:solidFill>
@@ -36114,7 +36135,7 @@
         <p:spPr>
           <a:xfrm>
             <a:off x="457200" y="274680"/>
-            <a:ext cx="8227080" cy="713520"/>
+            <a:ext cx="8226720" cy="713160"/>
           </a:xfrm>
           <a:prstGeom prst="rect">
             <a:avLst/>
@@ -36165,7 +36186,7 @@
         <p:spPr>
           <a:xfrm>
             <a:off x="914400" y="1219320"/>
-            <a:ext cx="7312680" cy="4798080"/>
+            <a:ext cx="7312320" cy="4797720"/>
           </a:xfrm>
           <a:prstGeom prst="rect">
             <a:avLst/>
@@ -36186,7 +36207,7 @@
             <a:noAutofit/>
           </a:bodyPr>
           <a:p>
-            <a:pPr marL="285840" indent="-283320">
+            <a:pPr marL="285840" indent="-282960">
               <a:lnSpc>
                 <a:spcPct val="100000"/>
               </a:lnSpc>
@@ -36212,7 +36233,7 @@
             </a:endParaRPr>
           </a:p>
           <a:p>
-            <a:pPr marL="285840" indent="-283320">
+            <a:pPr marL="285840" indent="-282960">
               <a:lnSpc>
                 <a:spcPct val="100000"/>
               </a:lnSpc>
@@ -36228,7 +36249,7 @@
             </a:endParaRPr>
           </a:p>
           <a:p>
-            <a:pPr marL="285840" indent="-283320" algn="just">
+            <a:pPr marL="285840" indent="-282960" algn="just">
               <a:lnSpc>
                 <a:spcPct val="100000"/>
               </a:lnSpc>
@@ -36254,7 +36275,7 @@
             </a:endParaRPr>
           </a:p>
           <a:p>
-            <a:pPr marL="285840" indent="-283320">
+            <a:pPr marL="285840" indent="-282960">
               <a:lnSpc>
                 <a:spcPct val="100000"/>
               </a:lnSpc>
@@ -36270,7 +36291,7 @@
             </a:endParaRPr>
           </a:p>
           <a:p>
-            <a:pPr marL="285840" indent="-283320">
+            <a:pPr marL="285840" indent="-282960">
               <a:lnSpc>
                 <a:spcPct val="100000"/>
               </a:lnSpc>
@@ -36286,7 +36307,7 @@
             </a:endParaRPr>
           </a:p>
           <a:p>
-            <a:pPr marL="285840" indent="-283320">
+            <a:pPr marL="285840" indent="-282960">
               <a:lnSpc>
                 <a:spcPct val="100000"/>
               </a:lnSpc>
@@ -36302,7 +36323,7 @@
             </a:endParaRPr>
           </a:p>
           <a:p>
-            <a:pPr marL="285840" indent="-283320">
+            <a:pPr marL="285840" indent="-282960">
               <a:lnSpc>
                 <a:spcPct val="100000"/>
               </a:lnSpc>
@@ -36318,7 +36339,7 @@
             </a:endParaRPr>
           </a:p>
           <a:p>
-            <a:pPr marL="285840" indent="-283320">
+            <a:pPr marL="285840" indent="-282960">
               <a:lnSpc>
                 <a:spcPct val="100000"/>
               </a:lnSpc>
@@ -36334,7 +36355,7 @@
             </a:endParaRPr>
           </a:p>
           <a:p>
-            <a:pPr marL="285840" indent="-283320">
+            <a:pPr marL="285840" indent="-282960">
               <a:lnSpc>
                 <a:spcPct val="100000"/>
               </a:lnSpc>
@@ -36360,7 +36381,7 @@
             </a:endParaRPr>
           </a:p>
           <a:p>
-            <a:pPr marL="285840" indent="-283320">
+            <a:pPr marL="285840" indent="-282960">
               <a:lnSpc>
                 <a:spcPct val="100000"/>
               </a:lnSpc>
@@ -36376,7 +36397,7 @@
             </a:endParaRPr>
           </a:p>
           <a:p>
-            <a:pPr marL="285840" indent="-283320">
+            <a:pPr marL="285840" indent="-282960">
               <a:lnSpc>
                 <a:spcPct val="100000"/>
               </a:lnSpc>
@@ -37510,7 +37531,7 @@
         <p:spPr>
           <a:xfrm>
             <a:off x="457200" y="274680"/>
-            <a:ext cx="8227080" cy="713520"/>
+            <a:ext cx="8226720" cy="713160"/>
           </a:xfrm>
           <a:prstGeom prst="rect">
             <a:avLst/>
@@ -37561,7 +37582,7 @@
         <p:spPr>
           <a:xfrm>
             <a:off x="914400" y="1219320"/>
-            <a:ext cx="7312680" cy="4798080"/>
+            <a:ext cx="7312320" cy="4797720"/>
           </a:xfrm>
           <a:prstGeom prst="rect">
             <a:avLst/>
@@ -37928,7 +37949,7 @@
         <p:spPr>
           <a:xfrm>
             <a:off x="457200" y="274680"/>
-            <a:ext cx="8227080" cy="713520"/>
+            <a:ext cx="8226720" cy="713160"/>
           </a:xfrm>
           <a:prstGeom prst="rect">
             <a:avLst/>
@@ -37979,7 +38000,7 @@
         <p:spPr>
           <a:xfrm>
             <a:off x="914400" y="1219320"/>
-            <a:ext cx="7312680" cy="4798080"/>
+            <a:ext cx="7312320" cy="4797720"/>
           </a:xfrm>
           <a:prstGeom prst="rect">
             <a:avLst/>
@@ -38088,7 +38109,7 @@
             </a:endParaRPr>
           </a:p>
           <a:p>
-            <a:pPr marL="285840" indent="-283320" algn="just">
+            <a:pPr marL="285840" indent="-282960" algn="just">
               <a:lnSpc>
                 <a:spcPct val="100000"/>
               </a:lnSpc>
@@ -38104,7 +38125,7 @@
             </a:endParaRPr>
           </a:p>
           <a:p>
-            <a:pPr marL="285840" indent="-283320">
+            <a:pPr marL="285840" indent="-282960">
               <a:lnSpc>
                 <a:spcPct val="100000"/>
               </a:lnSpc>
@@ -38160,7 +38181,7 @@
         <p:spPr>
           <a:xfrm>
             <a:off x="457200" y="274680"/>
-            <a:ext cx="8227080" cy="713520"/>
+            <a:ext cx="8226720" cy="713160"/>
           </a:xfrm>
           <a:prstGeom prst="rect">
             <a:avLst/>
@@ -38211,7 +38232,7 @@
         <p:spPr>
           <a:xfrm>
             <a:off x="914400" y="1219320"/>
-            <a:ext cx="7312680" cy="4798080"/>
+            <a:ext cx="7312320" cy="4797720"/>
           </a:xfrm>
           <a:prstGeom prst="rect">
             <a:avLst/>
@@ -38534,7 +38555,7 @@
         <p:spPr>
           <a:xfrm>
             <a:off x="457200" y="274680"/>
-            <a:ext cx="8227080" cy="713520"/>
+            <a:ext cx="8226720" cy="713160"/>
           </a:xfrm>
           <a:prstGeom prst="rect">
             <a:avLst/>
@@ -41197,7 +41218,7 @@
         <p:spPr>
           <a:xfrm>
             <a:off x="457200" y="274680"/>
-            <a:ext cx="8227080" cy="713520"/>
+            <a:ext cx="8226720" cy="713160"/>
           </a:xfrm>
           <a:prstGeom prst="rect">
             <a:avLst/>
@@ -44178,7 +44199,7 @@
         <p:spPr>
           <a:xfrm>
             <a:off x="457200" y="274680"/>
-            <a:ext cx="8227080" cy="713520"/>
+            <a:ext cx="8226720" cy="713160"/>
           </a:xfrm>
           <a:prstGeom prst="rect">
             <a:avLst/>
@@ -44229,7 +44250,7 @@
         <p:spPr>
           <a:xfrm>
             <a:off x="914400" y="1219320"/>
-            <a:ext cx="7312680" cy="4798080"/>
+            <a:ext cx="7312320" cy="4797720"/>
           </a:xfrm>
           <a:prstGeom prst="rect">
             <a:avLst/>
@@ -44250,7 +44271,7 @@
             <a:noAutofit/>
           </a:bodyPr>
           <a:p>
-            <a:pPr marL="266760" indent="-264240" algn="just">
+            <a:pPr marL="266760" indent="-263880" algn="just">
               <a:lnSpc>
                 <a:spcPct val="100000"/>
               </a:lnSpc>
@@ -44292,7 +44313,7 @@
             </a:endParaRPr>
           </a:p>
           <a:p>
-            <a:pPr marL="266760" indent="-264240" algn="just">
+            <a:pPr marL="266760" indent="-263880" algn="just">
               <a:lnSpc>
                 <a:spcPct val="100000"/>
               </a:lnSpc>
@@ -44374,7 +44395,7 @@
         <p:spPr>
           <a:xfrm>
             <a:off x="457200" y="274680"/>
-            <a:ext cx="8227080" cy="713520"/>
+            <a:ext cx="8226720" cy="713160"/>
           </a:xfrm>
           <a:prstGeom prst="rect">
             <a:avLst/>
@@ -44425,7 +44446,7 @@
         <p:spPr>
           <a:xfrm>
             <a:off x="914400" y="1219320"/>
-            <a:ext cx="7312680" cy="4798080"/>
+            <a:ext cx="7312320" cy="4797720"/>
           </a:xfrm>
           <a:prstGeom prst="rect">
             <a:avLst/>
@@ -45520,7 +45541,7 @@
         <p:spPr>
           <a:xfrm>
             <a:off x="457200" y="274680"/>
-            <a:ext cx="8227080" cy="713520"/>
+            <a:ext cx="8226720" cy="713160"/>
           </a:xfrm>
           <a:prstGeom prst="rect">
             <a:avLst/>
@@ -45571,7 +45592,7 @@
         <p:spPr>
           <a:xfrm>
             <a:off x="914400" y="1219320"/>
-            <a:ext cx="7312680" cy="4798080"/>
+            <a:ext cx="7312320" cy="4797720"/>
           </a:xfrm>
           <a:prstGeom prst="rect">
             <a:avLst/>
@@ -45592,7 +45613,7 @@
             <a:noAutofit/>
           </a:bodyPr>
           <a:p>
-            <a:pPr marL="285840" indent="-283320">
+            <a:pPr marL="285840" indent="-282960">
               <a:lnSpc>
                 <a:spcPct val="90000"/>
               </a:lnSpc>
@@ -45618,7 +45639,7 @@
             </a:endParaRPr>
           </a:p>
           <a:p>
-            <a:pPr marL="285840" indent="-283320">
+            <a:pPr marL="285840" indent="-282960">
               <a:lnSpc>
                 <a:spcPct val="90000"/>
               </a:lnSpc>
@@ -45650,7 +45671,7 @@
             </a:endParaRPr>
           </a:p>
           <a:p>
-            <a:pPr marL="285840" indent="-283320">
+            <a:pPr marL="285840" indent="-282960">
               <a:lnSpc>
                 <a:spcPct val="90000"/>
               </a:lnSpc>
@@ -45682,7 +45703,7 @@
             </a:endParaRPr>
           </a:p>
           <a:p>
-            <a:pPr marL="285840" indent="-283320">
+            <a:pPr marL="285840" indent="-282960">
               <a:lnSpc>
                 <a:spcPct val="90000"/>
               </a:lnSpc>
@@ -45714,7 +45735,7 @@
             </a:endParaRPr>
           </a:p>
           <a:p>
-            <a:pPr marL="285840" indent="-283320">
+            <a:pPr marL="285840" indent="-282960">
               <a:lnSpc>
                 <a:spcPct val="90000"/>
               </a:lnSpc>
@@ -45762,7 +45783,7 @@
             </a:endParaRPr>
           </a:p>
           <a:p>
-            <a:pPr marL="285840" indent="-283320">
+            <a:pPr marL="285840" indent="-282960">
               <a:lnSpc>
                 <a:spcPct val="100000"/>
               </a:lnSpc>
@@ -45788,7 +45809,7 @@
             </a:endParaRPr>
           </a:p>
           <a:p>
-            <a:pPr marL="285840" indent="-283320">
+            <a:pPr marL="285840" indent="-282960">
               <a:lnSpc>
                 <a:spcPct val="90000"/>
               </a:lnSpc>
@@ -45820,7 +45841,7 @@
             </a:endParaRPr>
           </a:p>
           <a:p>
-            <a:pPr marL="285840" indent="-283320">
+            <a:pPr marL="285840" indent="-282960">
               <a:lnSpc>
                 <a:spcPct val="90000"/>
               </a:lnSpc>
@@ -45852,7 +45873,7 @@
             </a:endParaRPr>
           </a:p>
           <a:p>
-            <a:pPr marL="285840" indent="-283320">
+            <a:pPr marL="285840" indent="-282960">
               <a:lnSpc>
                 <a:spcPct val="90000"/>
               </a:lnSpc>
@@ -45884,7 +45905,7 @@
             </a:endParaRPr>
           </a:p>
           <a:p>
-            <a:pPr marL="285840" indent="-283320">
+            <a:pPr marL="285840" indent="-282960">
               <a:lnSpc>
                 <a:spcPct val="90000"/>
               </a:lnSpc>
@@ -45916,7 +45937,7 @@
             </a:endParaRPr>
           </a:p>
           <a:p>
-            <a:pPr marL="285840" indent="-283320">
+            <a:pPr marL="285840" indent="-282960">
               <a:lnSpc>
                 <a:spcPct val="90000"/>
               </a:lnSpc>
@@ -45948,7 +45969,7 @@
             </a:endParaRPr>
           </a:p>
           <a:p>
-            <a:pPr marL="285840" indent="-283320">
+            <a:pPr marL="285840" indent="-282960">
               <a:lnSpc>
                 <a:spcPct val="90000"/>
               </a:lnSpc>
@@ -46036,7 +46057,7 @@
         <p:spPr>
           <a:xfrm>
             <a:off x="457200" y="274680"/>
-            <a:ext cx="8227080" cy="713520"/>
+            <a:ext cx="8226720" cy="713160"/>
           </a:xfrm>
           <a:prstGeom prst="rect">
             <a:avLst/>
@@ -46087,7 +46108,7 @@
         <p:spPr>
           <a:xfrm>
             <a:off x="914400" y="1219320"/>
-            <a:ext cx="7312680" cy="4798080"/>
+            <a:ext cx="7312320" cy="4797720"/>
           </a:xfrm>
           <a:prstGeom prst="rect">
             <a:avLst/>
@@ -46108,7 +46129,7 @@
             <a:noAutofit/>
           </a:bodyPr>
           <a:p>
-            <a:pPr marL="285840" indent="-283320">
+            <a:pPr marL="285840" indent="-282960">
               <a:lnSpc>
                 <a:spcPct val="100000"/>
               </a:lnSpc>
@@ -46134,7 +46155,7 @@
             </a:endParaRPr>
           </a:p>
           <a:p>
-            <a:pPr marL="285840" indent="-283320" algn="ctr">
+            <a:pPr marL="285840" indent="-282960" algn="ctr">
               <a:lnSpc>
                 <a:spcPct val="100000"/>
               </a:lnSpc>
@@ -46190,7 +46211,7 @@
             </a:endParaRPr>
           </a:p>
           <a:p>
-            <a:pPr marL="285840" indent="-283320">
+            <a:pPr marL="285840" indent="-282960">
               <a:lnSpc>
                 <a:spcPct val="100000"/>
               </a:lnSpc>
@@ -46206,7 +46227,7 @@
             </a:endParaRPr>
           </a:p>
           <a:p>
-            <a:pPr marL="285840" indent="-283320">
+            <a:pPr marL="285840" indent="-282960">
               <a:lnSpc>
                 <a:spcPct val="100000"/>
               </a:lnSpc>
@@ -46242,7 +46263,7 @@
         <p:spPr>
           <a:xfrm>
             <a:off x="914400" y="2833560"/>
-            <a:ext cx="7298280" cy="2220480"/>
+            <a:ext cx="7297920" cy="2220480"/>
           </a:xfrm>
           <a:prstGeom prst="rect">
             <a:avLst/>

</xml_diff>